<commit_message>
Add new indicators to reports
</commit_message>
<xml_diff>
--- a/Documentation/RentallPresentation.pptx
+++ b/Documentation/RentallPresentation.pptx
@@ -25975,7 +25975,7 @@
           <a:p>
             <a:fld id="{C764DE79-268F-4C1A-8933-263129D2AF90}" type="datetimeFigureOut">
               <a:rPr lang="en-US" dirty="0"/>
-              <a:t>6/21/2021</a:t>
+              <a:t>6/22/2021</a:t>
             </a:fld>
             <a:endParaRPr lang="en-US" dirty="0"/>
           </a:p>
@@ -26840,10 +26840,7 @@
             <a:r>
               <a:rPr lang="en-US" sz="8800" dirty="0" err="1">
                 <a:solidFill>
-                  <a:schemeClr val="accent2">
-                    <a:lumMod val="60000"/>
-                    <a:lumOff val="40000"/>
-                  </a:schemeClr>
+                  <a:srgbClr val="DF17D1"/>
                 </a:solidFill>
               </a:rPr>
               <a:t>A</a:t>
@@ -26856,8 +26853,16 @@
               <a:rPr lang="en-US" dirty="0"/>
             </a:br>
             <a:r>
-              <a:rPr lang="en-US" dirty="0"/>
-              <a:t>web app for lease management</a:t>
+              <a:rPr lang="en-US" sz="6000" dirty="0"/>
+              <a:t>web app for </a:t>
+            </a:r>
+            <a:r>
+              <a:rPr lang="en-US" sz="6000" dirty="0" err="1"/>
+              <a:t>leaseS</a:t>
+            </a:r>
+            <a:r>
+              <a:rPr lang="en-US" sz="6000" dirty="0"/>
+              <a:t> management</a:t>
             </a:r>
             <a:br>
               <a:rPr lang="en-US" dirty="0"/>
@@ -26964,10 +26969,7 @@
             <a:r>
               <a:rPr lang="en-US" dirty="0">
                 <a:solidFill>
-                  <a:schemeClr val="accent2">
-                    <a:lumMod val="60000"/>
-                    <a:lumOff val="40000"/>
-                  </a:schemeClr>
+                  <a:srgbClr val="DF17D1"/>
                 </a:solidFill>
               </a:rPr>
               <a:t>A</a:t>
@@ -27058,8 +27060,8 @@
         </p:blipFill>
         <p:spPr>
           <a:xfrm>
-            <a:off x="1784195" y="989936"/>
-            <a:ext cx="5384951" cy="4328976"/>
+            <a:off x="1947747" y="396087"/>
+            <a:ext cx="6285763" cy="5053141"/>
           </a:xfrm>
         </p:spPr>
       </p:pic>
@@ -27128,10 +27130,7 @@
             <a:r>
               <a:rPr lang="en-US" dirty="0">
                 <a:solidFill>
-                  <a:schemeClr val="accent2">
-                    <a:lumMod val="60000"/>
-                    <a:lumOff val="40000"/>
-                  </a:schemeClr>
+                  <a:srgbClr val="DF17D1"/>
                 </a:solidFill>
               </a:rPr>
               <a:t>A</a:t>
@@ -27198,14 +27197,14 @@
             <p:ph sz="quarter" idx="19"/>
             <p:extLst>
               <p:ext uri="{D42A27DB-BD31-4B8C-83A1-F6EECF244321}">
-                <p14:modId xmlns:p14="http://schemas.microsoft.com/office/powerpoint/2010/main" val="1796329249"/>
+                <p14:modId xmlns:p14="http://schemas.microsoft.com/office/powerpoint/2010/main" val="2057302459"/>
               </p:ext>
             </p:extLst>
           </p:nvPr>
         </p:nvGraphicFramePr>
         <p:xfrm>
           <a:off x="461963" y="1679575"/>
-          <a:ext cx="8208962" cy="2407920"/>
+          <a:ext cx="8208962" cy="2712720"/>
         </p:xfrm>
         <a:graphic>
           <a:graphicData uri="http://schemas.openxmlformats.org/drawingml/2006/table">
@@ -27229,15 +27228,16 @@
                   </a:extLst>
                 </a:gridCol>
               </a:tblGrid>
-              <a:tr h="370840">
+              <a:tr h="334061">
                 <a:tc>
                   <a:txBody>
                     <a:bodyPr/>
                     <a:lstStyle/>
                     <a:p>
+                      <a:pPr algn="ctr"/>
                       <a:r>
                         <a:rPr lang="en-US" sz="2000" dirty="0"/>
-                        <a:t>BACKEND</a:t>
+                        <a:t>BACK-END</a:t>
                       </a:r>
                     </a:p>
                   </a:txBody>
@@ -27248,9 +27248,10 @@
                     <a:bodyPr/>
                     <a:lstStyle/>
                     <a:p>
+                      <a:pPr algn="ctr"/>
                       <a:r>
                         <a:rPr lang="en-US" sz="2000" dirty="0"/>
-                        <a:t>FRONTEND</a:t>
+                        <a:t>FRONT-END</a:t>
                       </a:r>
                     </a:p>
                   </a:txBody>
@@ -27262,36 +27263,101 @@
                   </a:ext>
                 </a:extLst>
               </a:tr>
-              <a:tr h="370840">
+              <a:tr h="1696003">
                 <a:tc>
                   <a:txBody>
                     <a:bodyPr/>
                     <a:lstStyle/>
                     <a:p>
+                      <a:pPr marL="0" marR="0" lvl="0" indent="0" algn="l" defTabSz="685800" rtl="0" eaLnBrk="1" fontAlgn="auto" latinLnBrk="0" hangingPunct="1">
+                        <a:lnSpc>
+                          <a:spcPct val="100000"/>
+                        </a:lnSpc>
+                        <a:spcBef>
+                          <a:spcPts val="600"/>
+                        </a:spcBef>
+                        <a:spcAft>
+                          <a:spcPts val="0"/>
+                        </a:spcAft>
+                        <a:buClrTx/>
+                        <a:buSzTx/>
+                        <a:buFontTx/>
+                        <a:buNone/>
+                        <a:tabLst/>
+                        <a:defRPr/>
+                      </a:pPr>
+                      <a:r>
+                        <a:rPr lang="en-US" sz="1800" dirty="0"/>
+                        <a:t>.NET 5</a:t>
+                      </a:r>
+                    </a:p>
+                    <a:p>
+                      <a:pPr marL="0" marR="0" lvl="0" indent="0" algn="l" defTabSz="685800" rtl="0" eaLnBrk="1" fontAlgn="auto" latinLnBrk="0" hangingPunct="1">
+                        <a:lnSpc>
+                          <a:spcPct val="100000"/>
+                        </a:lnSpc>
+                        <a:spcBef>
+                          <a:spcPts val="600"/>
+                        </a:spcBef>
+                        <a:spcAft>
+                          <a:spcPts val="0"/>
+                        </a:spcAft>
+                        <a:buClrTx/>
+                        <a:buSzTx/>
+                        <a:buFontTx/>
+                        <a:buNone/>
+                        <a:tabLst/>
+                        <a:defRPr/>
+                      </a:pPr>
+                      <a:r>
+                        <a:rPr lang="en-US" sz="1800" dirty="0"/>
+                        <a:t>ASP.NET</a:t>
+                      </a:r>
+                    </a:p>
+                    <a:p>
+                      <a:pPr marL="0" marR="0" lvl="0" indent="0" algn="l" defTabSz="685800" rtl="0" eaLnBrk="1" fontAlgn="auto" latinLnBrk="0" hangingPunct="1">
+                        <a:lnSpc>
+                          <a:spcPct val="100000"/>
+                        </a:lnSpc>
+                        <a:spcBef>
+                          <a:spcPts val="600"/>
+                        </a:spcBef>
+                        <a:spcAft>
+                          <a:spcPts val="0"/>
+                        </a:spcAft>
+                        <a:buClrTx/>
+                        <a:buSzTx/>
+                        <a:buFontTx/>
+                        <a:buNone/>
+                        <a:tabLst/>
+                        <a:defRPr/>
+                      </a:pPr>
                       <a:r>
                         <a:rPr lang="en-US" sz="1800" dirty="0"/>
                         <a:t>C#</a:t>
                       </a:r>
                     </a:p>
                     <a:p>
-                      <a:r>
-                        <a:rPr lang="en-US" sz="1800" dirty="0" err="1"/>
-                        <a:t>.Net</a:t>
-                      </a:r>
-                      <a:endParaRPr lang="en-US" sz="1800" dirty="0"/>
-                    </a:p>
-                    <a:p>
+                      <a:pPr>
+                        <a:spcBef>
+                          <a:spcPts val="600"/>
+                        </a:spcBef>
+                      </a:pPr>
                       <a:r>
                         <a:rPr lang="en-US" sz="1800" dirty="0"/>
-                        <a:t>SQL Server</a:t>
+                        <a:t>SQL Server </a:t>
                       </a:r>
                     </a:p>
                     <a:p>
+                      <a:pPr>
+                        <a:spcBef>
+                          <a:spcPts val="600"/>
+                        </a:spcBef>
+                      </a:pPr>
                       <a:r>
-                        <a:rPr lang="en-US" sz="1800" dirty="0" err="1"/>
-                        <a:t>EntityFramework</a:t>
+                        <a:rPr lang="en-US" sz="1800" dirty="0"/>
+                        <a:t>Entity Framework</a:t>
                       </a:r>
-                      <a:endParaRPr lang="en-US" sz="1800" dirty="0"/>
                     </a:p>
                     <a:p>
                       <a:endParaRPr lang="en-US" sz="1800" dirty="0"/>
@@ -27307,24 +27373,44 @@
                     <a:bodyPr/>
                     <a:lstStyle/>
                     <a:p>
+                      <a:pPr>
+                        <a:spcBef>
+                          <a:spcPts val="600"/>
+                        </a:spcBef>
+                      </a:pPr>
                       <a:r>
                         <a:rPr lang="en-US" sz="1800" dirty="0"/>
-                        <a:t>Angular</a:t>
+                        <a:t>Angular </a:t>
                       </a:r>
                     </a:p>
                     <a:p>
+                      <a:pPr>
+                        <a:spcBef>
+                          <a:spcPts val="600"/>
+                        </a:spcBef>
+                      </a:pPr>
                       <a:r>
                         <a:rPr lang="en-US" sz="1800" dirty="0"/>
                         <a:t>HTML</a:t>
                       </a:r>
                     </a:p>
                     <a:p>
+                      <a:pPr>
+                        <a:spcBef>
+                          <a:spcPts val="600"/>
+                        </a:spcBef>
+                      </a:pPr>
                       <a:r>
                         <a:rPr lang="en-US" sz="1800" dirty="0"/>
                         <a:t>CSS</a:t>
                       </a:r>
                     </a:p>
                     <a:p>
+                      <a:pPr>
+                        <a:spcBef>
+                          <a:spcPts val="600"/>
+                        </a:spcBef>
+                      </a:pPr>
                       <a:r>
                         <a:rPr lang="en-US" sz="1800" dirty="0"/>
                         <a:t>Typescript</a:t>
@@ -27417,10 +27503,7 @@
             <a:r>
               <a:rPr lang="en-US" dirty="0">
                 <a:solidFill>
-                  <a:schemeClr val="accent2">
-                    <a:lumMod val="60000"/>
-                    <a:lumOff val="40000"/>
-                  </a:schemeClr>
+                  <a:srgbClr val="DF17D1"/>
                 </a:solidFill>
               </a:rPr>
               <a:t>A</a:t>
@@ -27466,7 +27549,7 @@
           <a:p>
             <a:r>
               <a:rPr lang="en-US" sz="1800" dirty="0"/>
-              <a:t>FUNCTIONALITY/Scope </a:t>
+              <a:t>FUNCTIONALITY</a:t>
             </a:r>
           </a:p>
         </p:txBody>
@@ -28466,6 +28549,15 @@
 </file>
 
 <file path=customXml/item2.xml><?xml version="1.0" encoding="utf-8"?>
+<?mso-contentType ?>
+<FormTemplates xmlns="http://schemas.microsoft.com/sharepoint/v3/contenttype/forms">
+  <Display>DocumentLibraryForm</Display>
+  <Edit>DocumentLibraryForm</Edit>
+  <New>DocumentLibraryForm</New>
+</FormTemplates>
+</file>
+
+<file path=customXml/item3.xml><?xml version="1.0" encoding="utf-8"?>
 <ct:contentTypeSchema xmlns:ct="http://schemas.microsoft.com/office/2006/metadata/contentType" xmlns:ma="http://schemas.microsoft.com/office/2006/metadata/properties/metaAttributes" ct:_="" ma:_="" ma:contentTypeName="Document" ma:contentTypeID="0x0101004F1B4B31AF359A48A401EEE379FFB37B" ma:contentTypeVersion="11" ma:contentTypeDescription="Create a new document." ma:contentTypeScope="" ma:versionID="a6a7422171e56efacaa0ff5cd494665c">
   <xsd:schema xmlns:xsd="http://www.w3.org/2001/XMLSchema" xmlns:xs="http://www.w3.org/2001/XMLSchema" xmlns:p="http://schemas.microsoft.com/office/2006/metadata/properties" xmlns:ns2="532134fb-f5a0-4ded-9879-b62317c7c28f" xmlns:ns3="33e4a1ea-af2b-4409-80d7-554cb809ebfd" targetNamespace="http://schemas.microsoft.com/office/2006/metadata/properties" ma:root="true" ma:fieldsID="93418f181c010373c98e17b63702bc72" ns2:_="" ns3:_="">
     <xsd:import namespace="532134fb-f5a0-4ded-9879-b62317c7c28f"/>
@@ -28678,15 +28770,6 @@
 </ct:contentTypeSchema>
 </file>
 
-<file path=customXml/item3.xml><?xml version="1.0" encoding="utf-8"?>
-<?mso-contentType ?>
-<FormTemplates xmlns="http://schemas.microsoft.com/sharepoint/v3/contenttype/forms">
-  <Display>DocumentLibraryForm</Display>
-  <Edit>DocumentLibraryForm</Edit>
-  <New>DocumentLibraryForm</New>
-</FormTemplates>
-</file>
-
 <file path=customXml/itemProps1.xml><?xml version="1.0" encoding="utf-8"?>
 <ds:datastoreItem xmlns:ds="http://schemas.openxmlformats.org/officeDocument/2006/customXml" ds:itemID="{C3EF0069-5052-456A-BF91-32D12549F688}">
   <ds:schemaRefs>
@@ -28705,6 +28788,14 @@
 </file>
 
 <file path=customXml/itemProps2.xml><?xml version="1.0" encoding="utf-8"?>
+<ds:datastoreItem xmlns:ds="http://schemas.openxmlformats.org/officeDocument/2006/customXml" ds:itemID="{51F6FA68-4601-46D6-8A0F-82E04AA3CCAB}">
+  <ds:schemaRefs>
+    <ds:schemaRef ds:uri="http://schemas.microsoft.com/sharepoint/v3/contenttype/forms"/>
+  </ds:schemaRefs>
+</ds:datastoreItem>
+</file>
+
+<file path=customXml/itemProps3.xml><?xml version="1.0" encoding="utf-8"?>
 <ds:datastoreItem xmlns:ds="http://schemas.openxmlformats.org/officeDocument/2006/customXml" ds:itemID="{B858839C-646E-4FAE-A9B5-CCE6983BF551}">
   <ds:schemaRefs>
     <ds:schemaRef ds:uri="http://schemas.microsoft.com/office/2006/metadata/contentType"/>
@@ -28721,12 +28812,4 @@
     <ds:schemaRef ds:uri="http://schemas.microsoft.com/internal/obd"/>
   </ds:schemaRefs>
 </ds:datastoreItem>
-</file>
-
-<file path=customXml/itemProps3.xml><?xml version="1.0" encoding="utf-8"?>
-<ds:datastoreItem xmlns:ds="http://schemas.openxmlformats.org/officeDocument/2006/customXml" ds:itemID="{51F6FA68-4601-46D6-8A0F-82E04AA3CCAB}">
-  <ds:schemaRefs>
-    <ds:schemaRef ds:uri="http://schemas.microsoft.com/sharepoint/v3/contenttype/forms"/>
-  </ds:schemaRefs>
-</ds:datastoreItem>
 </file>
</xml_diff>